<commit_message>
Update Economectics I paper presentation OSU (Spring '23).pptx
</commit_message>
<xml_diff>
--- a/Econometrics I (Spring 23)/Economectics I paper presentation OSU (Spring '23).pptx
+++ b/Econometrics I (Spring 23)/Economectics I paper presentation OSU (Spring '23).pptx
@@ -24,6 +24,7 @@
     <p:sldId id="272" r:id="rId18"/>
     <p:sldId id="273" r:id="rId19"/>
     <p:sldId id="274" r:id="rId20"/>
+    <p:sldId id="275" r:id="rId21"/>
   </p:sldIdLst>
   <p:sldSz cx="12192000" cy="6858000"/>
   <p:notesSz cx="6858000" cy="9144000"/>
@@ -125,6 +126,59 @@
 </p:presentation>
 </file>
 
+<file path=ppt/revisionInfo.xml><?xml version="1.0" encoding="utf-8"?>
+<p1510:revInfo xmlns:a="http://schemas.openxmlformats.org/drawingml/2006/main" xmlns:r="http://schemas.openxmlformats.org/officeDocument/2006/relationships" xmlns:p1510="http://schemas.microsoft.com/office/powerpoint/2015/10/main">
+  <p1510:revLst>
+    <p1510:client id="{99007635-CF25-47F3-8475-72D90FB4EE5D}" v="2" dt="2023-10-04T23:45:58.903"/>
+  </p1510:revLst>
+</p1510:revInfo>
+</file>
+
+<file path=ppt/changesInfos/changesInfo1.xml><?xml version="1.0" encoding="utf-8"?>
+<pc:chgInfo xmlns:a="http://schemas.openxmlformats.org/drawingml/2006/main" xmlns:r="http://schemas.openxmlformats.org/officeDocument/2006/relationships" xmlns:ac="http://schemas.microsoft.com/office/drawing/2013/main/command" xmlns:pc="http://schemas.microsoft.com/office/powerpoint/2013/main/command">
+  <pc:docChgLst>
+    <pc:chgData name="Karmakar, Hemal" userId="8e0c0607-2d2c-4176-b180-031f8940f0c7" providerId="ADAL" clId="{99007635-CF25-47F3-8475-72D90FB4EE5D}"/>
+    <pc:docChg chg="custSel addSld modSld">
+      <pc:chgData name="Karmakar, Hemal" userId="8e0c0607-2d2c-4176-b180-031f8940f0c7" providerId="ADAL" clId="{99007635-CF25-47F3-8475-72D90FB4EE5D}" dt="2023-10-04T23:46:30.193" v="55" actId="113"/>
+      <pc:docMkLst>
+        <pc:docMk/>
+      </pc:docMkLst>
+      <pc:sldChg chg="addSp delSp modSp add mod">
+        <pc:chgData name="Karmakar, Hemal" userId="8e0c0607-2d2c-4176-b180-031f8940f0c7" providerId="ADAL" clId="{99007635-CF25-47F3-8475-72D90FB4EE5D}" dt="2023-10-04T23:46:30.193" v="55" actId="113"/>
+        <pc:sldMkLst>
+          <pc:docMk/>
+          <pc:sldMk cId="4253065926" sldId="275"/>
+        </pc:sldMkLst>
+        <pc:spChg chg="add mod">
+          <ac:chgData name="Karmakar, Hemal" userId="8e0c0607-2d2c-4176-b180-031f8940f0c7" providerId="ADAL" clId="{99007635-CF25-47F3-8475-72D90FB4EE5D}" dt="2023-10-04T23:46:30.193" v="55" actId="113"/>
+          <ac:spMkLst>
+            <pc:docMk/>
+            <pc:sldMk cId="4253065926" sldId="275"/>
+            <ac:spMk id="6" creationId="{5B592E8E-3F2B-215E-8D7C-16963CD869B0}"/>
+          </ac:spMkLst>
+        </pc:spChg>
+        <pc:picChg chg="del">
+          <ac:chgData name="Karmakar, Hemal" userId="8e0c0607-2d2c-4176-b180-031f8940f0c7" providerId="ADAL" clId="{99007635-CF25-47F3-8475-72D90FB4EE5D}" dt="2023-10-04T23:45:36.638" v="1" actId="478"/>
+          <ac:picMkLst>
+            <pc:docMk/>
+            <pc:sldMk cId="4253065926" sldId="275"/>
+            <ac:picMk id="3" creationId="{406ABC52-F428-A965-C2FF-5D57B4EDD627}"/>
+          </ac:picMkLst>
+        </pc:picChg>
+        <pc:picChg chg="add mod">
+          <ac:chgData name="Karmakar, Hemal" userId="8e0c0607-2d2c-4176-b180-031f8940f0c7" providerId="ADAL" clId="{99007635-CF25-47F3-8475-72D90FB4EE5D}" dt="2023-10-04T23:45:37.653" v="2"/>
+          <ac:picMkLst>
+            <pc:docMk/>
+            <pc:sldMk cId="4253065926" sldId="275"/>
+            <ac:picMk id="5" creationId="{75B8B05B-58AE-BF94-E7A5-C55D48346D51}"/>
+          </ac:picMkLst>
+        </pc:picChg>
+      </pc:sldChg>
+    </pc:docChg>
+  </pc:docChgLst>
+</pc:chgInfo>
+</file>
+
 <file path=ppt/slideLayouts/slideLayout1.xml><?xml version="1.0" encoding="utf-8"?>
 <p:sldLayout xmlns:a="http://schemas.openxmlformats.org/drawingml/2006/main" xmlns:r="http://schemas.openxmlformats.org/officeDocument/2006/relationships" xmlns:p="http://schemas.openxmlformats.org/presentationml/2006/main" type="titleOnly" preserve="1">
   <p:cSld name="Title Only">
@@ -193,7 +247,7 @@
           <a:p>
             <a:fld id="{786E1BC7-34B3-4972-863D-AAD675700395}" type="datetimeFigureOut">
               <a:rPr lang="en-US" smtClean="0"/>
-              <a:t>6/4/2023</a:t>
+              <a:t>10/4/2023</a:t>
             </a:fld>
             <a:endParaRPr lang="en-US"/>
           </a:p>
@@ -434,7 +488,7 @@
           <a:p>
             <a:fld id="{786E1BC7-34B3-4972-863D-AAD675700395}" type="datetimeFigureOut">
               <a:rPr lang="en-US" smtClean="0"/>
-              <a:t>6/4/2023</a:t>
+              <a:t>10/4/2023</a:t>
             </a:fld>
             <a:endParaRPr lang="en-US"/>
           </a:p>
@@ -1883,6 +1937,144 @@
     <p:extLst>
       <p:ext uri="{BB962C8B-B14F-4D97-AF65-F5344CB8AC3E}">
         <p14:creationId xmlns:p14="http://schemas.microsoft.com/office/powerpoint/2010/main" val="3284853057"/>
+      </p:ext>
+    </p:extLst>
+  </p:cSld>
+  <p:clrMapOvr>
+    <a:masterClrMapping/>
+  </p:clrMapOvr>
+</p:sld>
+</file>
+
+<file path=ppt/slides/slide20.xml><?xml version="1.0" encoding="utf-8"?>
+<p:sld xmlns:a="http://schemas.openxmlformats.org/drawingml/2006/main" xmlns:r="http://schemas.openxmlformats.org/officeDocument/2006/relationships" xmlns:p="http://schemas.openxmlformats.org/presentationml/2006/main">
+  <p:cSld>
+    <p:bg>
+      <p:bgPr>
+        <a:noFill/>
+        <a:effectLst/>
+      </p:bgPr>
+    </p:bg>
+    <p:spTree>
+      <p:nvGrpSpPr>
+        <p:cNvPr id="1" name=""/>
+        <p:cNvGrpSpPr/>
+        <p:nvPr/>
+      </p:nvGrpSpPr>
+      <p:grpSpPr>
+        <a:xfrm>
+          <a:off x="0" y="0"/>
+          <a:ext cx="0" cy="0"/>
+          <a:chOff x="0" y="0"/>
+          <a:chExt cx="0" cy="0"/>
+        </a:xfrm>
+      </p:grpSpPr>
+      <p:sp>
+        <p:nvSpPr>
+          <p:cNvPr id="2" name="Title 1" hidden="1">
+            <a:extLst>
+              <a:ext uri="{FF2B5EF4-FFF2-40B4-BE49-F238E27FC236}">
+                <a16:creationId xmlns:a16="http://schemas.microsoft.com/office/drawing/2014/main" id="{3455719F-FDA1-803C-492F-7C0A69F981C9}"/>
+              </a:ext>
+            </a:extLst>
+          </p:cNvPr>
+          <p:cNvSpPr>
+            <a:spLocks noGrp="1"/>
+          </p:cNvSpPr>
+          <p:nvPr>
+            <p:ph type="title"/>
+          </p:nvPr>
+        </p:nvSpPr>
+        <p:spPr/>
+        <p:txBody>
+          <a:bodyPr/>
+          <a:lstStyle/>
+          <a:p>
+            <a:endParaRPr lang="en-US"/>
+          </a:p>
+        </p:txBody>
+      </p:sp>
+      <p:pic>
+        <p:nvPicPr>
+          <p:cNvPr id="5" name="Picture 4" descr="A screenshot of a computer&#10;&#10;Description automatically generated">
+            <a:extLst>
+              <a:ext uri="{FF2B5EF4-FFF2-40B4-BE49-F238E27FC236}">
+                <a16:creationId xmlns:a16="http://schemas.microsoft.com/office/drawing/2014/main" id="{75B8B05B-58AE-BF94-E7A5-C55D48346D51}"/>
+              </a:ext>
+            </a:extLst>
+          </p:cNvPr>
+          <p:cNvPicPr>
+            <a:picLocks noChangeAspect="1"/>
+          </p:cNvPicPr>
+          <p:nvPr/>
+        </p:nvPicPr>
+        <p:blipFill>
+          <a:blip r:embed="rId2">
+            <a:extLst>
+              <a:ext uri="{28A0092B-C50C-407E-A947-70E740481C1C}">
+                <a14:useLocalDpi xmlns:a14="http://schemas.microsoft.com/office/drawing/2010/main" val="0"/>
+              </a:ext>
+            </a:extLst>
+          </a:blip>
+          <a:stretch>
+            <a:fillRect/>
+          </a:stretch>
+        </p:blipFill>
+        <p:spPr>
+          <a:xfrm>
+            <a:off x="244174" y="1092080"/>
+            <a:ext cx="11703651" cy="4673840"/>
+          </a:xfrm>
+          <a:prstGeom prst="rect">
+            <a:avLst/>
+          </a:prstGeom>
+        </p:spPr>
+      </p:pic>
+      <p:sp>
+        <p:nvSpPr>
+          <p:cNvPr id="6" name="TextBox 5">
+            <a:extLst>
+              <a:ext uri="{FF2B5EF4-FFF2-40B4-BE49-F238E27FC236}">
+                <a16:creationId xmlns:a16="http://schemas.microsoft.com/office/drawing/2014/main" id="{5B592E8E-3F2B-215E-8D7C-16963CD869B0}"/>
+              </a:ext>
+            </a:extLst>
+          </p:cNvPr>
+          <p:cNvSpPr txBox="1"/>
+          <p:nvPr/>
+        </p:nvSpPr>
+        <p:spPr>
+          <a:xfrm>
+            <a:off x="540048" y="319119"/>
+            <a:ext cx="5265471" cy="461665"/>
+          </a:xfrm>
+          <a:prstGeom prst="rect">
+            <a:avLst/>
+          </a:prstGeom>
+          <a:noFill/>
+        </p:spPr>
+        <p:txBody>
+          <a:bodyPr wrap="square" rtlCol="0">
+            <a:spAutoFit/>
+          </a:bodyPr>
+          <a:lstStyle/>
+          <a:p>
+            <a:r>
+              <a:rPr lang="en-US" sz="2400" b="1" dirty="0">
+                <a:solidFill>
+                  <a:schemeClr val="accent4">
+                    <a:lumMod val="50000"/>
+                  </a:schemeClr>
+                </a:solidFill>
+              </a:rPr>
+              <a:t>Feedback Received for the Presentation</a:t>
+            </a:r>
+          </a:p>
+        </p:txBody>
+      </p:sp>
+    </p:spTree>
+    <p:extLst>
+      <p:ext uri="{BB962C8B-B14F-4D97-AF65-F5344CB8AC3E}">
+        <p14:creationId xmlns:p14="http://schemas.microsoft.com/office/powerpoint/2010/main" val="4253065926"/>
       </p:ext>
     </p:extLst>
   </p:cSld>

</xml_diff>